<commit_message>
user assigned managed id
</commit_message>
<xml_diff>
--- a/sqldb-aad-authentication/images/figures.pptx
+++ b/sqldb-aad-authentication/images/figures.pptx
@@ -11,6 +11,9 @@
     <p:sldId id="259" r:id="rId5"/>
     <p:sldId id="261" r:id="rId6"/>
     <p:sldId id="260" r:id="rId7"/>
+    <p:sldId id="262" r:id="rId8"/>
+    <p:sldId id="263" r:id="rId9"/>
+    <p:sldId id="264" r:id="rId10"/>
   </p:sldIdLst>
   <p:sldSz cx="12192000" cy="6858000"/>
   <p:notesSz cx="6858000" cy="9144000"/>
@@ -264,7 +267,7 @@
           <a:p>
             <a:fld id="{EE9BC1A2-3941-4F99-94F7-E87D860CDE54}" type="datetimeFigureOut">
               <a:rPr kumimoji="1" lang="ja-JP" altLang="en-US" smtClean="0"/>
-              <a:t>2020/3/4</a:t>
+              <a:t>2020/3/5</a:t>
             </a:fld>
             <a:endParaRPr kumimoji="1" lang="ja-JP" altLang="en-US"/>
           </a:p>
@@ -494,7 +497,7 @@
           <a:p>
             <a:fld id="{EE9BC1A2-3941-4F99-94F7-E87D860CDE54}" type="datetimeFigureOut">
               <a:rPr kumimoji="1" lang="ja-JP" altLang="en-US" smtClean="0"/>
-              <a:t>2020/3/4</a:t>
+              <a:t>2020/3/5</a:t>
             </a:fld>
             <a:endParaRPr kumimoji="1" lang="ja-JP" altLang="en-US"/>
           </a:p>
@@ -734,7 +737,7 @@
           <a:p>
             <a:fld id="{EE9BC1A2-3941-4F99-94F7-E87D860CDE54}" type="datetimeFigureOut">
               <a:rPr kumimoji="1" lang="ja-JP" altLang="en-US" smtClean="0"/>
-              <a:t>2020/3/4</a:t>
+              <a:t>2020/3/5</a:t>
             </a:fld>
             <a:endParaRPr kumimoji="1" lang="ja-JP" altLang="en-US"/>
           </a:p>
@@ -964,7 +967,7 @@
           <a:p>
             <a:fld id="{EE9BC1A2-3941-4F99-94F7-E87D860CDE54}" type="datetimeFigureOut">
               <a:rPr kumimoji="1" lang="ja-JP" altLang="en-US" smtClean="0"/>
-              <a:t>2020/3/4</a:t>
+              <a:t>2020/3/5</a:t>
             </a:fld>
             <a:endParaRPr kumimoji="1" lang="ja-JP" altLang="en-US"/>
           </a:p>
@@ -1239,7 +1242,7 @@
           <a:p>
             <a:fld id="{EE9BC1A2-3941-4F99-94F7-E87D860CDE54}" type="datetimeFigureOut">
               <a:rPr kumimoji="1" lang="ja-JP" altLang="en-US" smtClean="0"/>
-              <a:t>2020/3/4</a:t>
+              <a:t>2020/3/5</a:t>
             </a:fld>
             <a:endParaRPr kumimoji="1" lang="ja-JP" altLang="en-US"/>
           </a:p>
@@ -1568,7 +1571,7 @@
           <a:p>
             <a:fld id="{EE9BC1A2-3941-4F99-94F7-E87D860CDE54}" type="datetimeFigureOut">
               <a:rPr kumimoji="1" lang="ja-JP" altLang="en-US" smtClean="0"/>
-              <a:t>2020/3/4</a:t>
+              <a:t>2020/3/5</a:t>
             </a:fld>
             <a:endParaRPr kumimoji="1" lang="ja-JP" altLang="en-US"/>
           </a:p>
@@ -2044,7 +2047,7 @@
           <a:p>
             <a:fld id="{EE9BC1A2-3941-4F99-94F7-E87D860CDE54}" type="datetimeFigureOut">
               <a:rPr kumimoji="1" lang="ja-JP" altLang="en-US" smtClean="0"/>
-              <a:t>2020/3/4</a:t>
+              <a:t>2020/3/5</a:t>
             </a:fld>
             <a:endParaRPr kumimoji="1" lang="ja-JP" altLang="en-US"/>
           </a:p>
@@ -2185,7 +2188,7 @@
           <a:p>
             <a:fld id="{EE9BC1A2-3941-4F99-94F7-E87D860CDE54}" type="datetimeFigureOut">
               <a:rPr kumimoji="1" lang="ja-JP" altLang="en-US" smtClean="0"/>
-              <a:t>2020/3/4</a:t>
+              <a:t>2020/3/5</a:t>
             </a:fld>
             <a:endParaRPr kumimoji="1" lang="ja-JP" altLang="en-US"/>
           </a:p>
@@ -2298,7 +2301,7 @@
           <a:p>
             <a:fld id="{EE9BC1A2-3941-4F99-94F7-E87D860CDE54}" type="datetimeFigureOut">
               <a:rPr kumimoji="1" lang="ja-JP" altLang="en-US" smtClean="0"/>
-              <a:t>2020/3/4</a:t>
+              <a:t>2020/3/5</a:t>
             </a:fld>
             <a:endParaRPr kumimoji="1" lang="ja-JP" altLang="en-US"/>
           </a:p>
@@ -2641,7 +2644,7 @@
           <a:p>
             <a:fld id="{EE9BC1A2-3941-4F99-94F7-E87D860CDE54}" type="datetimeFigureOut">
               <a:rPr kumimoji="1" lang="ja-JP" altLang="en-US" smtClean="0"/>
-              <a:t>2020/3/4</a:t>
+              <a:t>2020/3/5</a:t>
             </a:fld>
             <a:endParaRPr kumimoji="1" lang="ja-JP" altLang="en-US"/>
           </a:p>
@@ -2929,7 +2932,7 @@
           <a:p>
             <a:fld id="{EE9BC1A2-3941-4F99-94F7-E87D860CDE54}" type="datetimeFigureOut">
               <a:rPr kumimoji="1" lang="ja-JP" altLang="en-US" smtClean="0"/>
-              <a:t>2020/3/4</a:t>
+              <a:t>2020/3/5</a:t>
             </a:fld>
             <a:endParaRPr kumimoji="1" lang="ja-JP" altLang="en-US"/>
           </a:p>
@@ -3202,7 +3205,7 @@
           <a:p>
             <a:fld id="{EE9BC1A2-3941-4F99-94F7-E87D860CDE54}" type="datetimeFigureOut">
               <a:rPr kumimoji="1" lang="ja-JP" altLang="en-US" smtClean="0"/>
-              <a:t>2020/3/4</a:t>
+              <a:t>2020/3/5</a:t>
             </a:fld>
             <a:endParaRPr kumimoji="1" lang="ja-JP" altLang="en-US"/>
           </a:p>
@@ -4274,6 +4277,342 @@
 </p:sld>
 </file>
 
+<file path=ppt/slides/slide7.xml><?xml version="1.0" encoding="utf-8"?>
+<p:sld xmlns:a="http://schemas.openxmlformats.org/drawingml/2006/main" xmlns:r="http://schemas.openxmlformats.org/officeDocument/2006/relationships" xmlns:p="http://schemas.openxmlformats.org/presentationml/2006/main">
+  <p:cSld>
+    <p:spTree>
+      <p:nvGrpSpPr>
+        <p:cNvPr id="1" name=""/>
+        <p:cNvGrpSpPr/>
+        <p:nvPr/>
+      </p:nvGrpSpPr>
+      <p:grpSpPr>
+        <a:xfrm>
+          <a:off x="0" y="0"/>
+          <a:ext cx="0" cy="0"/>
+          <a:chOff x="0" y="0"/>
+          <a:chExt cx="0" cy="0"/>
+        </a:xfrm>
+      </p:grpSpPr>
+      <p:sp>
+        <p:nvSpPr>
+          <p:cNvPr id="5" name="角丸四角形 4">
+            <a:extLst>
+              <a:ext uri="{FF2B5EF4-FFF2-40B4-BE49-F238E27FC236}">
+                <a16:creationId xmlns:a16="http://schemas.microsoft.com/office/drawing/2014/main" id="{66B91319-07D3-0D43-81DA-B90BA7FC93F9}"/>
+              </a:ext>
+            </a:extLst>
+          </p:cNvPr>
+          <p:cNvSpPr/>
+          <p:nvPr/>
+        </p:nvSpPr>
+        <p:spPr>
+          <a:xfrm>
+            <a:off x="7711223" y="1612488"/>
+            <a:ext cx="1203767" cy="451413"/>
+          </a:xfrm>
+          <a:prstGeom prst="roundRect">
+            <a:avLst/>
+          </a:prstGeom>
+          <a:noFill/>
+          <a:ln w="38100">
+            <a:solidFill>
+              <a:srgbClr val="FF0000"/>
+            </a:solidFill>
+            <a:prstDash val="dash"/>
+          </a:ln>
+        </p:spPr>
+        <p:style>
+          <a:lnRef idx="2">
+            <a:schemeClr val="accent1">
+              <a:shade val="50000"/>
+            </a:schemeClr>
+          </a:lnRef>
+          <a:fillRef idx="1">
+            <a:schemeClr val="accent1"/>
+          </a:fillRef>
+          <a:effectRef idx="0">
+            <a:schemeClr val="accent1"/>
+          </a:effectRef>
+          <a:fontRef idx="minor">
+            <a:schemeClr val="lt1"/>
+          </a:fontRef>
+        </p:style>
+        <p:txBody>
+          <a:bodyPr rtlCol="0" anchor="ctr"/>
+          <a:lstStyle/>
+          <a:p>
+            <a:pPr algn="ctr"/>
+            <a:endParaRPr kumimoji="1" lang="ja-JP" altLang="en-US"/>
+          </a:p>
+        </p:txBody>
+      </p:sp>
+      <p:pic>
+        <p:nvPicPr>
+          <p:cNvPr id="9" name="図 8">
+            <a:extLst>
+              <a:ext uri="{FF2B5EF4-FFF2-40B4-BE49-F238E27FC236}">
+                <a16:creationId xmlns:a16="http://schemas.microsoft.com/office/drawing/2014/main" id="{3EE0142D-50CC-7C4F-BEB9-A9F8D0FB4D5C}"/>
+              </a:ext>
+            </a:extLst>
+          </p:cNvPr>
+          <p:cNvPicPr>
+            <a:picLocks noChangeAspect="1"/>
+          </p:cNvPicPr>
+          <p:nvPr/>
+        </p:nvPicPr>
+        <p:blipFill>
+          <a:blip r:embed="rId2"/>
+          <a:stretch>
+            <a:fillRect/>
+          </a:stretch>
+        </p:blipFill>
+        <p:spPr>
+          <a:xfrm>
+            <a:off x="466421" y="441195"/>
+            <a:ext cx="6273800" cy="2794000"/>
+          </a:xfrm>
+          <a:prstGeom prst="rect">
+            <a:avLst/>
+          </a:prstGeom>
+          <a:ln>
+            <a:noFill/>
+          </a:ln>
+          <a:effectLst>
+            <a:outerShdw blurRad="292100" dist="139700" dir="2700000" algn="tl" rotWithShape="0">
+              <a:srgbClr val="333333">
+                <a:alpha val="65000"/>
+              </a:srgbClr>
+            </a:outerShdw>
+          </a:effectLst>
+        </p:spPr>
+      </p:pic>
+      <p:sp>
+        <p:nvSpPr>
+          <p:cNvPr id="10" name="角丸四角形 9">
+            <a:extLst>
+              <a:ext uri="{FF2B5EF4-FFF2-40B4-BE49-F238E27FC236}">
+                <a16:creationId xmlns:a16="http://schemas.microsoft.com/office/drawing/2014/main" id="{EBA5E73F-F30A-3145-8448-BB7C8CC0009A}"/>
+              </a:ext>
+            </a:extLst>
+          </p:cNvPr>
+          <p:cNvSpPr/>
+          <p:nvPr/>
+        </p:nvSpPr>
+        <p:spPr>
+          <a:xfrm>
+            <a:off x="4727914" y="1369722"/>
+            <a:ext cx="1938679" cy="410375"/>
+          </a:xfrm>
+          <a:prstGeom prst="roundRect">
+            <a:avLst/>
+          </a:prstGeom>
+          <a:noFill/>
+          <a:ln w="38100">
+            <a:solidFill>
+              <a:srgbClr val="FF0000"/>
+            </a:solidFill>
+            <a:prstDash val="dash"/>
+          </a:ln>
+        </p:spPr>
+        <p:style>
+          <a:lnRef idx="2">
+            <a:schemeClr val="accent1">
+              <a:shade val="50000"/>
+            </a:schemeClr>
+          </a:lnRef>
+          <a:fillRef idx="1">
+            <a:schemeClr val="accent1"/>
+          </a:fillRef>
+          <a:effectRef idx="0">
+            <a:schemeClr val="accent1"/>
+          </a:effectRef>
+          <a:fontRef idx="minor">
+            <a:schemeClr val="lt1"/>
+          </a:fontRef>
+        </p:style>
+        <p:txBody>
+          <a:bodyPr rtlCol="0" anchor="ctr"/>
+          <a:lstStyle/>
+          <a:p>
+            <a:pPr algn="ctr"/>
+            <a:endParaRPr kumimoji="1" lang="ja-JP" altLang="en-US"/>
+          </a:p>
+        </p:txBody>
+      </p:sp>
+      <p:pic>
+        <p:nvPicPr>
+          <p:cNvPr id="14" name="図 13">
+            <a:extLst>
+              <a:ext uri="{FF2B5EF4-FFF2-40B4-BE49-F238E27FC236}">
+                <a16:creationId xmlns:a16="http://schemas.microsoft.com/office/drawing/2014/main" id="{41EDBC29-C1EC-474D-834D-40E4BE7834E4}"/>
+              </a:ext>
+            </a:extLst>
+          </p:cNvPr>
+          <p:cNvPicPr>
+            <a:picLocks noChangeAspect="1"/>
+          </p:cNvPicPr>
+          <p:nvPr/>
+        </p:nvPicPr>
+        <p:blipFill>
+          <a:blip r:embed="rId3"/>
+          <a:stretch>
+            <a:fillRect/>
+          </a:stretch>
+        </p:blipFill>
+        <p:spPr>
+          <a:xfrm>
+            <a:off x="5166325" y="3235195"/>
+            <a:ext cx="5410200" cy="2794000"/>
+          </a:xfrm>
+          <a:prstGeom prst="rect">
+            <a:avLst/>
+          </a:prstGeom>
+        </p:spPr>
+      </p:pic>
+    </p:spTree>
+    <p:extLst>
+      <p:ext uri="{BB962C8B-B14F-4D97-AF65-F5344CB8AC3E}">
+        <p14:creationId xmlns:p14="http://schemas.microsoft.com/office/powerpoint/2010/main" val="1704442047"/>
+      </p:ext>
+    </p:extLst>
+  </p:cSld>
+  <p:clrMapOvr>
+    <a:masterClrMapping/>
+  </p:clrMapOvr>
+</p:sld>
+</file>
+
+<file path=ppt/slides/slide8.xml><?xml version="1.0" encoding="utf-8"?>
+<p:sld xmlns:a="http://schemas.openxmlformats.org/drawingml/2006/main" xmlns:r="http://schemas.openxmlformats.org/officeDocument/2006/relationships" xmlns:p="http://schemas.openxmlformats.org/presentationml/2006/main">
+  <p:cSld>
+    <p:spTree>
+      <p:nvGrpSpPr>
+        <p:cNvPr id="1" name=""/>
+        <p:cNvGrpSpPr/>
+        <p:nvPr/>
+      </p:nvGrpSpPr>
+      <p:grpSpPr>
+        <a:xfrm>
+          <a:off x="0" y="0"/>
+          <a:ext cx="0" cy="0"/>
+          <a:chOff x="0" y="0"/>
+          <a:chExt cx="0" cy="0"/>
+        </a:xfrm>
+      </p:grpSpPr>
+      <p:pic>
+        <p:nvPicPr>
+          <p:cNvPr id="15" name="図 14">
+            <a:extLst>
+              <a:ext uri="{FF2B5EF4-FFF2-40B4-BE49-F238E27FC236}">
+                <a16:creationId xmlns:a16="http://schemas.microsoft.com/office/drawing/2014/main" id="{5582C11B-EB03-DA45-9EDF-8289C34228EE}"/>
+              </a:ext>
+            </a:extLst>
+          </p:cNvPr>
+          <p:cNvPicPr>
+            <a:picLocks noChangeAspect="1"/>
+          </p:cNvPicPr>
+          <p:nvPr/>
+        </p:nvPicPr>
+        <p:blipFill>
+          <a:blip r:embed="rId2"/>
+          <a:stretch>
+            <a:fillRect/>
+          </a:stretch>
+        </p:blipFill>
+        <p:spPr>
+          <a:xfrm>
+            <a:off x="2266950" y="298450"/>
+            <a:ext cx="7658100" cy="6261100"/>
+          </a:xfrm>
+          <a:prstGeom prst="rect">
+            <a:avLst/>
+          </a:prstGeom>
+        </p:spPr>
+      </p:pic>
+    </p:spTree>
+    <p:extLst>
+      <p:ext uri="{BB962C8B-B14F-4D97-AF65-F5344CB8AC3E}">
+        <p14:creationId xmlns:p14="http://schemas.microsoft.com/office/powerpoint/2010/main" val="4265222244"/>
+      </p:ext>
+    </p:extLst>
+  </p:cSld>
+  <p:clrMapOvr>
+    <a:masterClrMapping/>
+  </p:clrMapOvr>
+</p:sld>
+</file>
+
+<file path=ppt/slides/slide9.xml><?xml version="1.0" encoding="utf-8"?>
+<p:sld xmlns:a="http://schemas.openxmlformats.org/drawingml/2006/main" xmlns:r="http://schemas.openxmlformats.org/officeDocument/2006/relationships" xmlns:p="http://schemas.openxmlformats.org/presentationml/2006/main">
+  <p:cSld>
+    <p:spTree>
+      <p:nvGrpSpPr>
+        <p:cNvPr id="1" name=""/>
+        <p:cNvGrpSpPr/>
+        <p:nvPr/>
+      </p:nvGrpSpPr>
+      <p:grpSpPr>
+        <a:xfrm>
+          <a:off x="0" y="0"/>
+          <a:ext cx="0" cy="0"/>
+          <a:chOff x="0" y="0"/>
+          <a:chExt cx="0" cy="0"/>
+        </a:xfrm>
+      </p:grpSpPr>
+      <p:pic>
+        <p:nvPicPr>
+          <p:cNvPr id="4" name="図 3">
+            <a:extLst>
+              <a:ext uri="{FF2B5EF4-FFF2-40B4-BE49-F238E27FC236}">
+                <a16:creationId xmlns:a16="http://schemas.microsoft.com/office/drawing/2014/main" id="{19B31A09-D0F7-C540-B046-AD35CAB16093}"/>
+              </a:ext>
+            </a:extLst>
+          </p:cNvPr>
+          <p:cNvPicPr>
+            <a:picLocks noChangeAspect="1"/>
+          </p:cNvPicPr>
+          <p:nvPr/>
+        </p:nvPicPr>
+        <p:blipFill>
+          <a:blip r:embed="rId2"/>
+          <a:stretch>
+            <a:fillRect/>
+          </a:stretch>
+        </p:blipFill>
+        <p:spPr>
+          <a:xfrm>
+            <a:off x="3765550" y="2400300"/>
+            <a:ext cx="4660900" cy="2057400"/>
+          </a:xfrm>
+          <a:prstGeom prst="rect">
+            <a:avLst/>
+          </a:prstGeom>
+          <a:ln>
+            <a:noFill/>
+          </a:ln>
+          <a:effectLst>
+            <a:outerShdw blurRad="292100" dist="139700" dir="2700000" algn="tl" rotWithShape="0">
+              <a:srgbClr val="333333">
+                <a:alpha val="65000"/>
+              </a:srgbClr>
+            </a:outerShdw>
+          </a:effectLst>
+        </p:spPr>
+      </p:pic>
+    </p:spTree>
+    <p:extLst>
+      <p:ext uri="{BB962C8B-B14F-4D97-AF65-F5344CB8AC3E}">
+        <p14:creationId xmlns:p14="http://schemas.microsoft.com/office/powerpoint/2010/main" val="41692192"/>
+      </p:ext>
+    </p:extLst>
+  </p:cSld>
+  <p:clrMapOvr>
+    <a:masterClrMapping/>
+  </p:clrMapOvr>
+</p:sld>
+</file>
+
 <file path=ppt/theme/theme1.xml><?xml version="1.0" encoding="utf-8"?>
 <a:theme xmlns:a="http://schemas.openxmlformats.org/drawingml/2006/main" name="Office テーマ">
   <a:themeElements>

</xml_diff>